<commit_message>
Added comments to notebook
</commit_message>
<xml_diff>
--- a/presentation-of-findings-cap03.pptx
+++ b/presentation-of-findings-cap03.pptx
@@ -294,7 +294,7 @@
   </p:defaultTextStyle>
   <p:extLst>
     <p:ext uri="{EFAFB233-063F-42B5-8137-9DF3F51BA10A}">
-      <p15:sldGuideLst xmlns="" xmlns:mc="http://schemas.openxmlformats.org/markup-compatibility/2006" xmlns:mv="urn:schemas-microsoft-com:mac:vml" xmlns:c="http://schemas.openxmlformats.org/drawingml/2006/chart" xmlns:dgm="http://schemas.openxmlformats.org/drawingml/2006/diagram" xmlns:o="urn:schemas-microsoft-com:office:office" xmlns:v="urn:schemas-microsoft-com:vml" xmlns:pvml="urn:schemas-microsoft-com:office:powerpoint" xmlns:com="http://schemas.openxmlformats.org/drawingml/2006/compatibility" xmlns:p14="http://schemas.microsoft.com/office/powerpoint/2010/main" xmlns:p15="http://schemas.microsoft.com/office/powerpoint/2012/main" xmlns:ahyp="http://schemas.microsoft.com/office/drawing/2018/hyperlinkcolor">
+      <p15:sldGuideLst xmlns:ahyp="http://schemas.microsoft.com/office/drawing/2018/hyperlinkcolor" xmlns:p15="http://schemas.microsoft.com/office/powerpoint/2012/main" xmlns:p14="http://schemas.microsoft.com/office/powerpoint/2010/main" xmlns:com="http://schemas.openxmlformats.org/drawingml/2006/compatibility" xmlns:pvml="urn:schemas-microsoft-com:office:powerpoint" xmlns:v="urn:schemas-microsoft-com:vml" xmlns:o="urn:schemas-microsoft-com:office:office" xmlns:dgm="http://schemas.openxmlformats.org/drawingml/2006/diagram" xmlns:c="http://schemas.openxmlformats.org/drawingml/2006/chart" xmlns:mv="urn:schemas-microsoft-com:mac:vml" xmlns:mc="http://schemas.openxmlformats.org/markup-compatibility/2006" xmlns="">
         <p15:guide id="1" orient="horz" pos="1620">
           <p15:clr>
             <a:srgbClr val="A4A3A4"/>
@@ -2283,7 +2283,7 @@
             <a:fld id="{4421CBBC-0FE8-4C0F-838F-6E760AD84306}" type="datetimeFigureOut">
               <a:rPr lang="en-US" smtClean="0"/>
               <a:pPr/>
-              <a:t>10/16/2020</a:t>
+              <a:t>10/19/2020</a:t>
             </a:fld>
             <a:endParaRPr lang="en-US"/>
           </a:p>
@@ -2468,7 +2468,7 @@
             <a:fld id="{4421CBBC-0FE8-4C0F-838F-6E760AD84306}" type="datetimeFigureOut">
               <a:rPr lang="en-US" smtClean="0"/>
               <a:pPr/>
-              <a:t>10/16/2020</a:t>
+              <a:t>10/19/2020</a:t>
             </a:fld>
             <a:endParaRPr lang="en-US"/>
           </a:p>
@@ -2663,7 +2663,7 @@
             <a:fld id="{4421CBBC-0FE8-4C0F-838F-6E760AD84306}" type="datetimeFigureOut">
               <a:rPr lang="en-US" smtClean="0"/>
               <a:pPr/>
-              <a:t>10/16/2020</a:t>
+              <a:t>10/19/2020</a:t>
             </a:fld>
             <a:endParaRPr lang="en-US"/>
           </a:p>
@@ -4199,7 +4199,7 @@
             <a:fld id="{4421CBBC-0FE8-4C0F-838F-6E760AD84306}" type="datetimeFigureOut">
               <a:rPr lang="en-US" smtClean="0"/>
               <a:pPr/>
-              <a:t>10/16/2020</a:t>
+              <a:t>10/19/2020</a:t>
             </a:fld>
             <a:endParaRPr lang="en-US"/>
           </a:p>
@@ -4461,7 +4461,7 @@
             <a:fld id="{4421CBBC-0FE8-4C0F-838F-6E760AD84306}" type="datetimeFigureOut">
               <a:rPr lang="en-US" smtClean="0"/>
               <a:pPr/>
-              <a:t>10/16/2020</a:t>
+              <a:t>10/19/2020</a:t>
             </a:fld>
             <a:endParaRPr lang="en-US"/>
           </a:p>
@@ -4745,7 +4745,7 @@
             <a:fld id="{4421CBBC-0FE8-4C0F-838F-6E760AD84306}" type="datetimeFigureOut">
               <a:rPr lang="en-US" smtClean="0"/>
               <a:pPr/>
-              <a:t>10/16/2020</a:t>
+              <a:t>10/19/2020</a:t>
             </a:fld>
             <a:endParaRPr lang="en-US"/>
           </a:p>
@@ -5143,7 +5143,7 @@
             <a:fld id="{4421CBBC-0FE8-4C0F-838F-6E760AD84306}" type="datetimeFigureOut">
               <a:rPr lang="en-US" smtClean="0"/>
               <a:pPr/>
-              <a:t>10/16/2020</a:t>
+              <a:t>10/19/2020</a:t>
             </a:fld>
             <a:endParaRPr lang="en-US"/>
           </a:p>
@@ -5313,7 +5313,7 @@
             <a:fld id="{4421CBBC-0FE8-4C0F-838F-6E760AD84306}" type="datetimeFigureOut">
               <a:rPr lang="en-US" smtClean="0"/>
               <a:pPr/>
-              <a:t>10/16/2020</a:t>
+              <a:t>10/19/2020</a:t>
             </a:fld>
             <a:endParaRPr lang="en-US"/>
           </a:p>
@@ -5423,7 +5423,7 @@
             <a:fld id="{4421CBBC-0FE8-4C0F-838F-6E760AD84306}" type="datetimeFigureOut">
               <a:rPr lang="en-US" smtClean="0"/>
               <a:pPr/>
-              <a:t>10/16/2020</a:t>
+              <a:t>10/19/2020</a:t>
             </a:fld>
             <a:endParaRPr lang="en-US"/>
           </a:p>
@@ -5703,7 +5703,7 @@
             <a:fld id="{4421CBBC-0FE8-4C0F-838F-6E760AD84306}" type="datetimeFigureOut">
               <a:rPr lang="en-US" smtClean="0"/>
               <a:pPr/>
-              <a:t>10/16/2020</a:t>
+              <a:t>10/19/2020</a:t>
             </a:fld>
             <a:endParaRPr lang="en-US"/>
           </a:p>
@@ -6011,7 +6011,7 @@
             <a:fld id="{4421CBBC-0FE8-4C0F-838F-6E760AD84306}" type="datetimeFigureOut">
               <a:rPr lang="en-US" smtClean="0"/>
               <a:pPr/>
-              <a:t>10/16/2020</a:t>
+              <a:t>10/19/2020</a:t>
             </a:fld>
             <a:endParaRPr lang="en-US"/>
           </a:p>
@@ -6802,7 +6802,7 @@
             <a:fld id="{4421CBBC-0FE8-4C0F-838F-6E760AD84306}" type="datetimeFigureOut">
               <a:rPr lang="en-US" smtClean="0"/>
               <a:pPr/>
-              <a:t>10/16/2020</a:t>
+              <a:t>10/19/2020</a:t>
             </a:fld>
             <a:endParaRPr lang="en-US"/>
           </a:p>
@@ -7494,31 +7494,7 @@
                 <a:cs typeface="Raleway Thin"/>
                 <a:sym typeface="Raleway Thin"/>
               </a:rPr>
-              <a:t>Spotify Music </a:t>
-            </a:r>
-            <a:r>
-              <a:rPr lang="en" sz="5400" dirty="0" smtClean="0">
-                <a:solidFill>
-                  <a:schemeClr val="accent3"/>
-                </a:solidFill>
-                <a:latin typeface="Raleway Thin" charset="0"/>
-                <a:ea typeface="Raleway Thin"/>
-                <a:cs typeface="Raleway Thin"/>
-                <a:sym typeface="Raleway Thin"/>
-              </a:rPr>
-              <a:t>Cluster </a:t>
-            </a:r>
-            <a:r>
-              <a:rPr lang="en" sz="5400" dirty="0" smtClean="0">
-                <a:solidFill>
-                  <a:schemeClr val="accent3"/>
-                </a:solidFill>
-                <a:latin typeface="Raleway Thin" charset="0"/>
-                <a:ea typeface="Raleway Thin"/>
-                <a:cs typeface="Raleway Thin"/>
-                <a:sym typeface="Raleway Thin"/>
-              </a:rPr>
-              <a:t>Analysis</a:t>
+              <a:t>Spotify Music Cluster Analysis</a:t>
             </a:r>
             <a:endParaRPr sz="5400" dirty="0">
               <a:solidFill>
@@ -7701,13 +7677,6 @@
               </a:rPr>
               <a:t>Many of the clusters had a very diverse population of all of the genres</a:t>
             </a:r>
-            <a:endParaRPr lang="en" sz="1800" dirty="0" smtClean="0">
-              <a:solidFill>
-                <a:srgbClr val="FFFFFF"/>
-              </a:solidFill>
-              <a:latin typeface="Lato"/>
-              <a:sym typeface="Lato"/>
-            </a:endParaRPr>
           </a:p>
           <a:p>
             <a:pPr marL="457200" indent="-274320">
@@ -7748,11 +7717,6 @@
               </a:rPr>
               <a:t>Audio features are the best way to group musical performers</a:t>
             </a:r>
-            <a:endParaRPr lang="en-US" sz="1800" dirty="0" smtClean="0">
-              <a:solidFill>
-                <a:schemeClr val="bg1"/>
-              </a:solidFill>
-            </a:endParaRPr>
           </a:p>
           <a:p>
             <a:pPr marL="457200" indent="-274320">
@@ -7775,13 +7739,6 @@
               </a:rPr>
               <a:t>It  is difficult to group musical performers by genre given the audio features.</a:t>
             </a:r>
-            <a:endParaRPr lang="en" sz="1800" dirty="0" smtClean="0">
-              <a:solidFill>
-                <a:srgbClr val="FFFFFF"/>
-              </a:solidFill>
-              <a:latin typeface="Lato"/>
-              <a:sym typeface="Lato"/>
-            </a:endParaRPr>
           </a:p>
         </p:txBody>
       </p:sp>
@@ -8225,27 +8182,7 @@
                 <a:latin typeface="Lato"/>
                 <a:sym typeface="Lato"/>
               </a:rPr>
-              <a:t>This </a:t>
-            </a:r>
-            <a:r>
-              <a:rPr lang="en" sz="1800" dirty="0" smtClean="0">
-                <a:solidFill>
-                  <a:srgbClr val="FFFFFF"/>
-                </a:solidFill>
-                <a:latin typeface="Lato"/>
-                <a:sym typeface="Lato"/>
-              </a:rPr>
-              <a:t>data can be used by music festival promoters, such as Bonaroo and other diverse music </a:t>
-            </a:r>
-            <a:r>
-              <a:rPr lang="en" sz="1800" dirty="0" smtClean="0">
-                <a:solidFill>
-                  <a:srgbClr val="FFFFFF"/>
-                </a:solidFill>
-                <a:latin typeface="Lato"/>
-                <a:sym typeface="Lato"/>
-              </a:rPr>
-              <a:t>festivals</a:t>
+              <a:t>This data can be used by music festival promoters, such as Bonaroo and other diverse music festivals</a:t>
             </a:r>
           </a:p>
           <a:p>
@@ -8291,13 +8228,6 @@
               </a:rPr>
               <a:t>It doesn’t matter what genre is on what stage</a:t>
             </a:r>
-            <a:endParaRPr lang="en" sz="1800" dirty="0" smtClean="0">
-              <a:solidFill>
-                <a:srgbClr val="FFFFFF"/>
-              </a:solidFill>
-              <a:latin typeface="Lato"/>
-              <a:sym typeface="Lato"/>
-            </a:endParaRPr>
           </a:p>
         </p:txBody>
       </p:sp>
@@ -8760,7 +8690,7 @@
                   <a:srgbClr val="FFFFFF"/>
                 </a:highlight>
               </a:rPr>
-              <a:t>Question: </a:t>
+              <a:t>Question: Is there a way to cluster music and performers into groups by using the music genre or the musical audio features of a song as defined by Spotify</a:t>
             </a:r>
             <a:r>
               <a:rPr lang="en-US" sz="1200" dirty="0" smtClean="0">
@@ -8771,8 +8701,24 @@
                   <a:srgbClr val="FFFFFF"/>
                 </a:highlight>
               </a:rPr>
-              <a:t>Is there a way to cluster music and performers into groups by using th</a:t>
-            </a:r>
+              <a:t>?</a:t>
+            </a:r>
+          </a:p>
+          <a:p>
+            <a:pPr indent="-274320">
+              <a:lnSpc>
+                <a:spcPct val="150000"/>
+              </a:lnSpc>
+              <a:spcBef>
+                <a:spcPts val="600"/>
+              </a:spcBef>
+              <a:buClr>
+                <a:schemeClr val="dk1"/>
+              </a:buClr>
+              <a:buSzPct val="175000"/>
+              <a:buFont typeface="Arial" pitchFamily="34" charset="0"/>
+              <a:buChar char="•"/>
+            </a:pPr>
             <a:r>
               <a:rPr lang="en-US" sz="1200" dirty="0" smtClean="0">
                 <a:solidFill>
@@ -8782,7 +8728,7 @@
                   <a:srgbClr val="FFFFFF"/>
                 </a:highlight>
               </a:rPr>
-              <a:t>e music genre or the musical audio features of a song </a:t>
+              <a:t>Music genres </a:t>
             </a:r>
             <a:r>
               <a:rPr lang="en-US" sz="1200" dirty="0" smtClean="0">
@@ -8793,18 +8739,7 @@
                   <a:srgbClr val="FFFFFF"/>
                 </a:highlight>
               </a:rPr>
-              <a:t>as defined by </a:t>
-            </a:r>
-            <a:r>
-              <a:rPr lang="en-US" sz="1200" dirty="0" smtClean="0">
-                <a:solidFill>
-                  <a:schemeClr val="dk1"/>
-                </a:solidFill>
-                <a:highlight>
-                  <a:srgbClr val="FFFFFF"/>
-                </a:highlight>
-              </a:rPr>
-              <a:t>Spotify?</a:t>
+              <a:t>analyzed:</a:t>
             </a:r>
             <a:endParaRPr lang="en-US" sz="1200" dirty="0" smtClean="0">
               <a:solidFill>
@@ -8814,33 +8749,6 @@
                 <a:srgbClr val="FFFFFF"/>
               </a:highlight>
             </a:endParaRPr>
-          </a:p>
-          <a:p>
-            <a:pPr indent="-274320">
-              <a:lnSpc>
-                <a:spcPct val="150000"/>
-              </a:lnSpc>
-              <a:spcBef>
-                <a:spcPts val="600"/>
-              </a:spcBef>
-              <a:buClr>
-                <a:schemeClr val="dk1"/>
-              </a:buClr>
-              <a:buSzPct val="175000"/>
-              <a:buFont typeface="Arial" pitchFamily="34" charset="0"/>
-              <a:buChar char="•"/>
-            </a:pPr>
-            <a:r>
-              <a:rPr lang="en-US" sz="1200" dirty="0" smtClean="0">
-                <a:solidFill>
-                  <a:schemeClr val="dk1"/>
-                </a:solidFill>
-                <a:highlight>
-                  <a:srgbClr val="FFFFFF"/>
-                </a:highlight>
-              </a:rPr>
-              <a:t>Music genres analyzed:</a:t>
-            </a:r>
           </a:p>
         </p:txBody>
       </p:sp>
@@ -9567,29 +9475,7 @@
                   <a:srgbClr val="FFFFFF"/>
                 </a:highlight>
               </a:rPr>
-              <a:t>Musical </a:t>
-            </a:r>
-            <a:r>
-              <a:rPr lang="en-US" sz="1200" dirty="0" smtClean="0">
-                <a:solidFill>
-                  <a:schemeClr val="dk1"/>
-                </a:solidFill>
-                <a:highlight>
-                  <a:srgbClr val="FFFFFF"/>
-                </a:highlight>
-              </a:rPr>
-              <a:t>audio features </a:t>
-            </a:r>
-            <a:r>
-              <a:rPr lang="en-US" sz="1200" dirty="0" smtClean="0">
-                <a:solidFill>
-                  <a:schemeClr val="dk1"/>
-                </a:solidFill>
-                <a:highlight>
-                  <a:srgbClr val="FFFFFF"/>
-                </a:highlight>
-              </a:rPr>
-              <a:t>analyzed:</a:t>
+              <a:t>Musical audio features analyzed:</a:t>
             </a:r>
           </a:p>
         </p:txBody>
@@ -9657,19 +9543,7 @@
               <a:rPr lang="en-US" sz="1000" dirty="0" smtClean="0">
                 <a:latin typeface="+mn-lt"/>
               </a:rPr>
-              <a:t>ow suitable </a:t>
-            </a:r>
-            <a:r>
-              <a:rPr lang="en-US" sz="1000" dirty="0" smtClean="0">
-                <a:latin typeface="+mn-lt"/>
-              </a:rPr>
-              <a:t>a track is for dancing based on a combination of musical elements including </a:t>
-            </a:r>
-            <a:r>
-              <a:rPr lang="en-US" sz="1000" dirty="0" smtClean="0">
-                <a:latin typeface="+mn-lt"/>
-              </a:rPr>
-              <a:t>tempo, etc.</a:t>
+              <a:t>ow suitable a track is for dancing based on a combination of musical elements including tempo, etc.</a:t>
             </a:r>
             <a:endParaRPr lang="en-US" sz="1000" kern="1200" noProof="0" dirty="0" smtClean="0">
               <a:solidFill>
@@ -9730,13 +9604,7 @@
               <a:rPr lang="en-US" sz="1000" dirty="0" smtClean="0">
                 <a:latin typeface="+mn-lt"/>
               </a:rPr>
-              <a:t> </a:t>
-            </a:r>
-            <a:r>
-              <a:rPr lang="en-US" sz="1000" dirty="0" smtClean="0">
-                <a:latin typeface="+mn-lt"/>
-              </a:rPr>
-              <a:t>perceptual measure of intensity and activity.</a:t>
+              <a:t> perceptual measure of intensity and activity.</a:t>
             </a:r>
             <a:endParaRPr kumimoji="0" lang="en-US" sz="1000" b="0" i="0" u="none" strike="noStrike" kern="1200" cap="none" spc="0" normalizeH="0" baseline="0" dirty="0" smtClean="0">
               <a:ln>
@@ -9837,11 +9705,7 @@
             </a:r>
             <a:r>
               <a:rPr lang="en-US" sz="1000" dirty="0" smtClean="0"/>
-              <a:t>redicts </a:t>
-            </a:r>
-            <a:r>
-              <a:rPr lang="en-US" sz="1000" dirty="0" smtClean="0"/>
-              <a:t>whether a track contains no vocals</a:t>
+              <a:t>redicts whether a track contains no vocals</a:t>
             </a:r>
             <a:endParaRPr lang="en-US" sz="1000" kern="1200" dirty="0" smtClean="0">
               <a:solidFill>
@@ -9882,11 +9746,7 @@
             </a:r>
             <a:r>
               <a:rPr lang="en-US" sz="1000" dirty="0" smtClean="0"/>
-              <a:t>detects </a:t>
-            </a:r>
-            <a:r>
-              <a:rPr lang="en-US" sz="1000" dirty="0" smtClean="0"/>
-              <a:t>the presence of spoken words in a track</a:t>
+              <a:t>detects the presence of spoken words in a track</a:t>
             </a:r>
             <a:endParaRPr lang="en-US" sz="1000" kern="1200" dirty="0" smtClean="0">
               <a:solidFill>
@@ -10011,7 +9871,7 @@
             </a:r>
           </a:p>
           <a:p>
-            <a:pPr marL="457200" lvl="0" indent="-336550">
+            <a:pPr marL="457200" lvl="1" indent="-336550">
               <a:buClr>
                 <a:srgbClr val="FFFFFF"/>
               </a:buClr>
@@ -10033,7 +9893,7 @@
             </a:r>
           </a:p>
           <a:p>
-            <a:pPr marL="457200" lvl="0" indent="-336550">
+            <a:pPr marL="457200" lvl="1" indent="-336550">
               <a:lnSpc>
                 <a:spcPct val="150000"/>
               </a:lnSpc>
@@ -10058,7 +9918,7 @@
             </a:r>
           </a:p>
           <a:p>
-            <a:pPr marL="457200" lvl="0" indent="-336550">
+            <a:pPr marL="457200" lvl="1" indent="-336550">
               <a:lnSpc>
                 <a:spcPct val="150000"/>
               </a:lnSpc>
@@ -10080,7 +9940,7 @@
             </a:endParaRPr>
           </a:p>
           <a:p>
-            <a:pPr marL="457200" lvl="0" indent="-336550">
+            <a:pPr marL="457200" lvl="1" indent="-336550">
               <a:lnSpc>
                 <a:spcPct val="150000"/>
               </a:lnSpc>
@@ -10102,7 +9962,7 @@
             </a:endParaRPr>
           </a:p>
           <a:p>
-            <a:pPr marL="457200" lvl="0" indent="-336550">
+            <a:pPr marL="457200" lvl="1" indent="-336550">
               <a:lnSpc>
                 <a:spcPct val="150000"/>
               </a:lnSpc>
@@ -10124,7 +9984,7 @@
             </a:endParaRPr>
           </a:p>
           <a:p>
-            <a:pPr marL="457200" lvl="0" indent="-336550">
+            <a:pPr marL="457200" lvl="1" indent="-336550">
               <a:lnSpc>
                 <a:spcPct val="150000"/>
               </a:lnSpc>
@@ -10146,7 +10006,7 @@
             </a:endParaRPr>
           </a:p>
           <a:p>
-            <a:pPr marL="457200" lvl="0" indent="-336550">
+            <a:pPr marL="457200" lvl="1" indent="-336550">
               <a:lnSpc>
                 <a:spcPct val="150000"/>
               </a:lnSpc>
@@ -10168,7 +10028,7 @@
             </a:endParaRPr>
           </a:p>
           <a:p>
-            <a:pPr marL="457200" lvl="0" indent="-336550">
+            <a:pPr marL="457200" lvl="1" indent="-336550">
               <a:lnSpc>
                 <a:spcPct val="150000"/>
               </a:lnSpc>
@@ -10188,7 +10048,7 @@
             </a:endParaRPr>
           </a:p>
           <a:p>
-            <a:pPr marL="457200" lvl="0" indent="-336550">
+            <a:pPr marL="457200" lvl="1" indent="-336550">
               <a:lnSpc>
                 <a:spcPct val="150000"/>
               </a:lnSpc>
@@ -10209,19 +10069,7 @@
                 <a:cs typeface="Lato"/>
                 <a:sym typeface="Lato"/>
               </a:rPr>
-              <a:t>This file also contains information about the individual songs such as the levels of certain musical traits (danceability, speechiness, etc).  These levels are also defined </a:t>
-            </a:r>
-            <a:r>
-              <a:rPr lang="en-US" dirty="0" smtClean="0">
-                <a:solidFill>
-                  <a:srgbClr val="FFFFFF"/>
-                </a:solidFill>
-                <a:latin typeface="Lato"/>
-                <a:ea typeface="Lato"/>
-                <a:cs typeface="Lato"/>
-                <a:sym typeface="Lato"/>
-              </a:rPr>
-              <a:t>by Spotify.</a:t>
+              <a:t>This file also contains information about the individual songs such as the levels of certain musical traits (danceability, speechiness, etc).  These levels are also defined by Spotify.</a:t>
             </a:r>
             <a:endParaRPr lang="en-US" dirty="0" smtClean="0">
               <a:solidFill>
@@ -10235,7 +10083,7 @@
             </a:endParaRPr>
           </a:p>
           <a:p>
-            <a:pPr marL="457200" lvl="0" indent="-336550">
+            <a:pPr marL="457200" lvl="1" indent="-336550">
               <a:lnSpc>
                 <a:spcPct val="150000"/>
               </a:lnSpc>
@@ -10465,12 +10313,6 @@
               </a:rPr>
               <a:t>Audio Features</a:t>
             </a:r>
-            <a:endParaRPr lang="en-US" sz="1600" b="1" u="sng" dirty="0" smtClean="0">
-              <a:solidFill>
-                <a:schemeClr val="bg1"/>
-              </a:solidFill>
-              <a:latin typeface="Lato" charset="0"/>
-            </a:endParaRPr>
           </a:p>
           <a:p>
             <a:pPr>
@@ -10487,16 +10329,7 @@
                 </a:solidFill>
                 <a:latin typeface="Lato" charset="0"/>
               </a:rPr>
-              <a:t> </a:t>
-            </a:r>
-            <a:r>
-              <a:rPr lang="en-US" sz="1600" dirty="0" smtClean="0">
-                <a:solidFill>
-                  <a:schemeClr val="bg1"/>
-                </a:solidFill>
-                <a:latin typeface="Lato" charset="0"/>
-              </a:rPr>
-              <a:t>Danceability</a:t>
+              <a:t> Danceability</a:t>
             </a:r>
           </a:p>
           <a:p>
@@ -10532,16 +10365,7 @@
                 </a:solidFill>
                 <a:latin typeface="Lato" charset="0"/>
               </a:rPr>
-              <a:t> </a:t>
-            </a:r>
-            <a:r>
-              <a:rPr lang="en-US" sz="1600" dirty="0" smtClean="0">
-                <a:solidFill>
-                  <a:schemeClr val="bg1"/>
-                </a:solidFill>
-                <a:latin typeface="Lato" charset="0"/>
-              </a:rPr>
-              <a:t>Mode</a:t>
+              <a:t> Mode</a:t>
             </a:r>
           </a:p>
           <a:p>
@@ -10579,12 +10403,6 @@
               </a:rPr>
               <a:t> Speechiness</a:t>
             </a:r>
-            <a:endParaRPr lang="en-US" sz="1600" dirty="0" smtClean="0">
-              <a:solidFill>
-                <a:schemeClr val="bg1"/>
-              </a:solidFill>
-              <a:latin typeface="Lato" charset="0"/>
-            </a:endParaRPr>
           </a:p>
         </p:txBody>
       </p:sp>
@@ -10633,19 +10451,7 @@
                 <a:cs typeface="Lato"/>
                 <a:sym typeface="Lato"/>
               </a:rPr>
-              <a:t>A sample of 10000 records were used for the clustering models and </a:t>
-            </a:r>
-            <a:r>
-              <a:rPr lang="en" sz="1600" noProof="0" dirty="0" smtClean="0">
-                <a:solidFill>
-                  <a:schemeClr val="bg1"/>
-                </a:solidFill>
-                <a:latin typeface="Lato"/>
-                <a:ea typeface="Lato"/>
-                <a:cs typeface="Lato"/>
-                <a:sym typeface="Lato"/>
-              </a:rPr>
-              <a:t>analysis</a:t>
+              <a:t>A sample of 10000 records were used for the clustering models and analysis</a:t>
             </a:r>
           </a:p>
           <a:p>
@@ -10809,16 +10615,7 @@
                 </a:solidFill>
                 <a:latin typeface="Lato" charset="0"/>
               </a:rPr>
-              <a:t> </a:t>
-            </a:r>
-            <a:r>
-              <a:rPr lang="en-US" sz="1600" dirty="0" smtClean="0">
-                <a:solidFill>
-                  <a:schemeClr val="bg1"/>
-                </a:solidFill>
-                <a:latin typeface="Lato" charset="0"/>
-              </a:rPr>
-              <a:t>Hierarchical</a:t>
+              <a:t> Hierarchical</a:t>
             </a:r>
           </a:p>
           <a:p>
@@ -10838,12 +10635,6 @@
               </a:rPr>
               <a:t>UMAP</a:t>
             </a:r>
-            <a:endParaRPr lang="en-US" sz="1600" dirty="0" smtClean="0">
-              <a:solidFill>
-                <a:schemeClr val="bg1"/>
-              </a:solidFill>
-              <a:latin typeface="Lato" charset="0"/>
-            </a:endParaRPr>
           </a:p>
         </p:txBody>
       </p:sp>
@@ -11169,17 +10960,8 @@
               <a:rPr lang="en-US" sz="1200" dirty="0" smtClean="0">
                 <a:latin typeface="Lato" charset="0"/>
               </a:rPr>
-              <a:t> </a:t>
-            </a:r>
-            <a:r>
-              <a:rPr lang="en-US" sz="1200" dirty="0" smtClean="0">
-                <a:latin typeface="Lato" charset="0"/>
-              </a:rPr>
-              <a:t>Metal, classical and jazz have low danceability. I observed a large number of metal and jazz songs in cluster 3.</a:t>
-            </a:r>
-            <a:endParaRPr lang="en-US" sz="1200" dirty="0" smtClean="0">
-              <a:latin typeface="Lato" charset="0"/>
-            </a:endParaRPr>
+              <a:t> Metal, classical and jazz have low danceability. I observed a large number of metal and jazz songs in cluster 3.</a:t>
+            </a:r>
           </a:p>
         </p:txBody>
       </p:sp>
@@ -11231,17 +11013,8 @@
               <a:rPr lang="en-US" sz="1200" dirty="0" smtClean="0">
                 <a:latin typeface="Lato" charset="0"/>
               </a:rPr>
-              <a:t> </a:t>
-            </a:r>
-            <a:r>
-              <a:rPr lang="en-US" sz="1200" dirty="0" smtClean="0">
-                <a:latin typeface="Lato" charset="0"/>
-              </a:rPr>
-              <a:t>Cluster 3 appears to have the lowest danceability</a:t>
-            </a:r>
-            <a:endParaRPr lang="en-US" sz="1200" dirty="0" smtClean="0">
-              <a:latin typeface="Lato" charset="0"/>
-            </a:endParaRPr>
+              <a:t> Cluster 3 appears to have the lowest danceability</a:t>
+            </a:r>
           </a:p>
         </p:txBody>
       </p:sp>
@@ -11483,9 +11256,6 @@
               </a:rPr>
               <a:t> Classical, jazz and blues have low energy. I observed a large number of classical and jazz songs in cluster 3</a:t>
             </a:r>
-            <a:endParaRPr lang="en-US" sz="1200" dirty="0" smtClean="0">
-              <a:latin typeface="Lato" charset="0"/>
-            </a:endParaRPr>
           </a:p>
         </p:txBody>
       </p:sp>
@@ -11524,9 +11294,6 @@
               </a:rPr>
               <a:t> Cluster 3 appears to have the lowest energy</a:t>
             </a:r>
-            <a:endParaRPr lang="en-US" sz="1200" dirty="0" smtClean="0">
-              <a:latin typeface="Lato" charset="0"/>
-            </a:endParaRPr>
           </a:p>
         </p:txBody>
       </p:sp>
@@ -11766,17 +11533,8 @@
               <a:rPr lang="en-US" sz="1200" dirty="0" smtClean="0">
                 <a:latin typeface="Lato" charset="0"/>
               </a:rPr>
-              <a:t> </a:t>
-            </a:r>
-            <a:r>
-              <a:rPr lang="en-US" sz="1200" dirty="0" smtClean="0">
-                <a:latin typeface="Lato" charset="0"/>
-              </a:rPr>
-              <a:t>The rest of the genres have low speechiness. Not many of those songs were in cluster 0.</a:t>
-            </a:r>
-            <a:endParaRPr lang="en-US" sz="1200" dirty="0" smtClean="0">
-              <a:latin typeface="Lato" charset="0"/>
-            </a:endParaRPr>
+              <a:t> The rest of the genres have low speechiness. Not many of those songs were in cluster 0.</a:t>
+            </a:r>
           </a:p>
         </p:txBody>
       </p:sp>

</xml_diff>